<commit_message>
- Updates to slides
</commit_message>
<xml_diff>
--- a/Yorkshore-BrassBitCoin.pptx
+++ b/Yorkshore-BrassBitCoin.pptx
@@ -2395,7 +2395,7 @@
           <a:p>
             <a:fld id="{0DCA0844-C266-46EC-A036-E1634F64C44A}" type="datetimeFigureOut">
               <a:rPr lang="en-US"/>
-              <a:t>3/1/2018</a:t>
+              <a:t>3/4/2018</a:t>
             </a:fld>
             <a:endParaRPr dirty="0"/>
           </a:p>
@@ -2560,7 +2560,7 @@
           <a:p>
             <a:fld id="{28C08BCD-7B2F-4BCE-87AF-5D67EFFE4D17}" type="datetimeFigureOut">
               <a:rPr lang="en-US"/>
-              <a:t>3/1/2018</a:t>
+              <a:t>3/4/2018</a:t>
             </a:fld>
             <a:endParaRPr dirty="0"/>
           </a:p>
@@ -3858,7 +3858,7 @@
             <a:fld id="{8E36636D-D922-432D-A958-524484B5923D}" type="datetimeFigureOut">
               <a:rPr lang="en-US"/>
               <a:pPr/>
-              <a:t>3/1/2018</a:t>
+              <a:t>3/4/2018</a:t>
             </a:fld>
             <a:endParaRPr dirty="0"/>
           </a:p>
@@ -4234,7 +4234,7 @@
             <a:fld id="{749F4917-CE56-4645-8050-1555FA0B180B}" type="datetimeFigureOut">
               <a:rPr lang="en-US"/>
               <a:pPr/>
-              <a:t>3/1/2018</a:t>
+              <a:t>3/4/2018</a:t>
             </a:fld>
             <a:endParaRPr dirty="0"/>
           </a:p>
@@ -4557,7 +4557,7 @@
             <a:fld id="{8E36636D-D922-432D-A958-524484B5923D}" type="datetimeFigureOut">
               <a:rPr lang="en-US"/>
               <a:pPr/>
-              <a:t>3/1/2018</a:t>
+              <a:t>3/4/2018</a:t>
             </a:fld>
             <a:endParaRPr dirty="0"/>
           </a:p>
@@ -4718,7 +4718,7 @@
             <a:fld id="{8E36636D-D922-432D-A958-524484B5923D}" type="datetimeFigureOut">
               <a:rPr lang="en-US"/>
               <a:pPr/>
-              <a:t>3/1/2018</a:t>
+              <a:t>3/4/2018</a:t>
             </a:fld>
             <a:endParaRPr dirty="0"/>
           </a:p>
@@ -4941,7 +4941,7 @@
             <a:fld id="{8E36636D-D922-432D-A958-524484B5923D}" type="datetimeFigureOut">
               <a:rPr lang="en-US"/>
               <a:pPr/>
-              <a:t>3/1/2018</a:t>
+              <a:t>3/4/2018</a:t>
             </a:fld>
             <a:endParaRPr dirty="0"/>
           </a:p>
@@ -5363,7 +5363,7 @@
             <a:fld id="{8E36636D-D922-432D-A958-524484B5923D}" type="datetimeFigureOut">
               <a:rPr lang="en-US"/>
               <a:pPr/>
-              <a:t>3/1/2018</a:t>
+              <a:t>3/4/2018</a:t>
             </a:fld>
             <a:endParaRPr dirty="0"/>
           </a:p>
@@ -5866,7 +5866,7 @@
             <a:fld id="{8E36636D-D922-432D-A958-524484B5923D}" type="datetimeFigureOut">
               <a:rPr lang="en-US"/>
               <a:pPr/>
-              <a:t>3/1/2018</a:t>
+              <a:t>3/4/2018</a:t>
             </a:fld>
             <a:endParaRPr dirty="0"/>
           </a:p>
@@ -6167,7 +6167,7 @@
             <a:fld id="{8E36636D-D922-432D-A958-524484B5923D}" type="datetimeFigureOut">
               <a:rPr lang="en-US"/>
               <a:pPr/>
-              <a:t>3/1/2018</a:t>
+              <a:t>3/4/2018</a:t>
             </a:fld>
             <a:endParaRPr dirty="0"/>
           </a:p>
@@ -6608,7 +6608,7 @@
             <a:fld id="{8E36636D-D922-432D-A958-524484B5923D}" type="datetimeFigureOut">
               <a:rPr lang="en-US"/>
               <a:pPr/>
-              <a:t>3/1/2018</a:t>
+              <a:t>3/4/2018</a:t>
             </a:fld>
             <a:endParaRPr dirty="0"/>
           </a:p>
@@ -6735,7 +6735,7 @@
             <a:fld id="{8E36636D-D922-432D-A958-524484B5923D}" type="datetimeFigureOut">
               <a:rPr lang="en-US"/>
               <a:pPr/>
-              <a:t>3/1/2018</a:t>
+              <a:t>3/4/2018</a:t>
             </a:fld>
             <a:endParaRPr dirty="0"/>
           </a:p>
@@ -6839,7 +6839,7 @@
             <a:fld id="{8E36636D-D922-432D-A958-524484B5923D}" type="datetimeFigureOut">
               <a:rPr lang="en-US"/>
               <a:pPr/>
-              <a:t>3/1/2018</a:t>
+              <a:t>3/4/2018</a:t>
             </a:fld>
             <a:endParaRPr dirty="0"/>
           </a:p>
@@ -7258,7 +7258,7 @@
             <a:fld id="{8E36636D-D922-432D-A958-524484B5923D}" type="datetimeFigureOut">
               <a:rPr lang="en-US"/>
               <a:pPr/>
-              <a:t>3/1/2018</a:t>
+              <a:t>3/4/2018</a:t>
             </a:fld>
             <a:endParaRPr dirty="0"/>
           </a:p>
@@ -7760,7 +7760,7 @@
             <a:fld id="{8E36636D-D922-432D-A958-524484B5923D}" type="datetimeFigureOut">
               <a:rPr lang="en-US"/>
               <a:pPr/>
-              <a:t>3/1/2018</a:t>
+              <a:t>3/4/2018</a:t>
             </a:fld>
             <a:endParaRPr dirty="0"/>
           </a:p>
@@ -8437,11 +8437,11 @@
             </a:r>
             <a:r>
               <a:rPr lang="en-GB" dirty="0" err="1"/>
-              <a:t>BrassBit</a:t>
+              <a:t>BrassBitCoin</a:t>
             </a:r>
             <a:r>
               <a:rPr lang="en-GB" dirty="0"/>
-              <a:t> coin block is made up of</a:t>
+              <a:t> block is made up of</a:t>
             </a:r>
           </a:p>
           <a:p>
@@ -10425,7 +10425,7 @@
         <p:spPr>
           <a:xfrm>
             <a:off x="7678589" y="227818"/>
-            <a:ext cx="4320480" cy="5466112"/>
+            <a:ext cx="4320480" cy="5022914"/>
           </a:xfrm>
           <a:prstGeom prst="rect">
             <a:avLst/>
@@ -10663,7 +10663,7 @@
                 <a:ea typeface="+mj-ea"/>
                 <a:cs typeface="+mj-cs"/>
               </a:rPr>
-              <a:t>Other bits (meta data)</a:t>
+              <a:t>Other meta data</a:t>
             </a:r>
             <a:br>
               <a:rPr lang="en-GB" sz="2400" dirty="0"/>
@@ -10891,7 +10891,7 @@
             <a:pPr lvl="1"/>
             <a:r>
               <a:rPr lang="en-GB" dirty="0"/>
-              <a:t>The hash must meet some (hard) criteria</a:t>
+              <a:t>The hash has some (hard) criteria</a:t>
             </a:r>
           </a:p>
           <a:p>

</xml_diff>